<commit_message>
Added the HLA Differences
</commit_message>
<xml_diff>
--- a/RepoDb.Raw/Files/HLA.pptx
+++ b/RepoDb.Raw/Files/HLA.pptx
@@ -6,6 +6,7 @@
   </p:sldMasterIdLst>
   <p:sldIdLst>
     <p:sldId id="256" r:id="rId2"/>
+    <p:sldId id="257" r:id="rId3"/>
   </p:sldIdLst>
   <p:sldSz cx="12192000" cy="6858000"/>
   <p:notesSz cx="6858000" cy="9144000"/>
@@ -243,7 +244,7 @@
           <a:p>
             <a:fld id="{9F96FC77-8E1C-452B-A1D4-6C868B74231D}" type="datetimeFigureOut">
               <a:rPr lang="en-US" smtClean="0"/>
-              <a:t>5/27/2019</a:t>
+              <a:t>12/28/2019</a:t>
             </a:fld>
             <a:endParaRPr lang="en-US"/>
           </a:p>
@@ -413,7 +414,7 @@
           <a:p>
             <a:fld id="{9F96FC77-8E1C-452B-A1D4-6C868B74231D}" type="datetimeFigureOut">
               <a:rPr lang="en-US" smtClean="0"/>
-              <a:t>5/27/2019</a:t>
+              <a:t>12/28/2019</a:t>
             </a:fld>
             <a:endParaRPr lang="en-US"/>
           </a:p>
@@ -593,7 +594,7 @@
           <a:p>
             <a:fld id="{9F96FC77-8E1C-452B-A1D4-6C868B74231D}" type="datetimeFigureOut">
               <a:rPr lang="en-US" smtClean="0"/>
-              <a:t>5/27/2019</a:t>
+              <a:t>12/28/2019</a:t>
             </a:fld>
             <a:endParaRPr lang="en-US"/>
           </a:p>
@@ -763,7 +764,7 @@
           <a:p>
             <a:fld id="{9F96FC77-8E1C-452B-A1D4-6C868B74231D}" type="datetimeFigureOut">
               <a:rPr lang="en-US" smtClean="0"/>
-              <a:t>5/27/2019</a:t>
+              <a:t>12/28/2019</a:t>
             </a:fld>
             <a:endParaRPr lang="en-US"/>
           </a:p>
@@ -1009,7 +1010,7 @@
           <a:p>
             <a:fld id="{9F96FC77-8E1C-452B-A1D4-6C868B74231D}" type="datetimeFigureOut">
               <a:rPr lang="en-US" smtClean="0"/>
-              <a:t>5/27/2019</a:t>
+              <a:t>12/28/2019</a:t>
             </a:fld>
             <a:endParaRPr lang="en-US"/>
           </a:p>
@@ -1241,7 +1242,7 @@
           <a:p>
             <a:fld id="{9F96FC77-8E1C-452B-A1D4-6C868B74231D}" type="datetimeFigureOut">
               <a:rPr lang="en-US" smtClean="0"/>
-              <a:t>5/27/2019</a:t>
+              <a:t>12/28/2019</a:t>
             </a:fld>
             <a:endParaRPr lang="en-US"/>
           </a:p>
@@ -1608,7 +1609,7 @@
           <a:p>
             <a:fld id="{9F96FC77-8E1C-452B-A1D4-6C868B74231D}" type="datetimeFigureOut">
               <a:rPr lang="en-US" smtClean="0"/>
-              <a:t>5/27/2019</a:t>
+              <a:t>12/28/2019</a:t>
             </a:fld>
             <a:endParaRPr lang="en-US"/>
           </a:p>
@@ -1726,7 +1727,7 @@
           <a:p>
             <a:fld id="{9F96FC77-8E1C-452B-A1D4-6C868B74231D}" type="datetimeFigureOut">
               <a:rPr lang="en-US" smtClean="0"/>
-              <a:t>5/27/2019</a:t>
+              <a:t>12/28/2019</a:t>
             </a:fld>
             <a:endParaRPr lang="en-US"/>
           </a:p>
@@ -1821,7 +1822,7 @@
           <a:p>
             <a:fld id="{9F96FC77-8E1C-452B-A1D4-6C868B74231D}" type="datetimeFigureOut">
               <a:rPr lang="en-US" smtClean="0"/>
-              <a:t>5/27/2019</a:t>
+              <a:t>12/28/2019</a:t>
             </a:fld>
             <a:endParaRPr lang="en-US"/>
           </a:p>
@@ -2098,7 +2099,7 @@
           <a:p>
             <a:fld id="{9F96FC77-8E1C-452B-A1D4-6C868B74231D}" type="datetimeFigureOut">
               <a:rPr lang="en-US" smtClean="0"/>
-              <a:t>5/27/2019</a:t>
+              <a:t>12/28/2019</a:t>
             </a:fld>
             <a:endParaRPr lang="en-US"/>
           </a:p>
@@ -2351,7 +2352,7 @@
           <a:p>
             <a:fld id="{9F96FC77-8E1C-452B-A1D4-6C868B74231D}" type="datetimeFigureOut">
               <a:rPr lang="en-US" smtClean="0"/>
-              <a:t>5/27/2019</a:t>
+              <a:t>12/28/2019</a:t>
             </a:fld>
             <a:endParaRPr lang="en-US"/>
           </a:p>
@@ -2564,7 +2565,7 @@
           <a:p>
             <a:fld id="{9F96FC77-8E1C-452B-A1D4-6C868B74231D}" type="datetimeFigureOut">
               <a:rPr lang="en-US" smtClean="0"/>
-              <a:t>5/27/2019</a:t>
+              <a:t>12/28/2019</a:t>
             </a:fld>
             <a:endParaRPr lang="en-US"/>
           </a:p>
@@ -5222,6 +5223,854 @@
 </p:sld>
 </file>
 
+<file path=ppt/slides/slide2.xml><?xml version="1.0" encoding="utf-8"?>
+<p:sld xmlns:a="http://schemas.openxmlformats.org/drawingml/2006/main" xmlns:r="http://schemas.openxmlformats.org/officeDocument/2006/relationships" xmlns:p="http://schemas.openxmlformats.org/presentationml/2006/main">
+  <p:cSld>
+    <p:spTree>
+      <p:nvGrpSpPr>
+        <p:cNvPr id="1" name=""/>
+        <p:cNvGrpSpPr/>
+        <p:nvPr/>
+      </p:nvGrpSpPr>
+      <p:grpSpPr>
+        <a:xfrm>
+          <a:off x="0" y="0"/>
+          <a:ext cx="0" cy="0"/>
+          <a:chOff x="0" y="0"/>
+          <a:chExt cx="0" cy="0"/>
+        </a:xfrm>
+      </p:grpSpPr>
+      <p:sp>
+        <p:nvSpPr>
+          <p:cNvPr id="4" name="Rounded Rectangle 3"/>
+          <p:cNvSpPr/>
+          <p:nvPr/>
+        </p:nvSpPr>
+        <p:spPr>
+          <a:xfrm>
+            <a:off x="1746462" y="1093281"/>
+            <a:ext cx="1828800" cy="796189"/>
+          </a:xfrm>
+          <a:prstGeom prst="roundRect">
+            <a:avLst/>
+          </a:prstGeom>
+        </p:spPr>
+        <p:style>
+          <a:lnRef idx="2">
+            <a:schemeClr val="accent3"/>
+          </a:lnRef>
+          <a:fillRef idx="1">
+            <a:schemeClr val="lt1"/>
+          </a:fillRef>
+          <a:effectRef idx="0">
+            <a:schemeClr val="accent3"/>
+          </a:effectRef>
+          <a:fontRef idx="minor">
+            <a:schemeClr val="dk1"/>
+          </a:fontRef>
+        </p:style>
+        <p:txBody>
+          <a:bodyPr rtlCol="0" anchor="ctr"/>
+          <a:lstStyle/>
+          <a:p>
+            <a:pPr algn="ctr"/>
+            <a:r>
+              <a:rPr lang="en-US" sz="1200" dirty="0" smtClean="0"/>
+              <a:t>Micro ORM</a:t>
+            </a:r>
+          </a:p>
+          <a:p>
+            <a:pPr algn="ctr"/>
+            <a:r>
+              <a:rPr lang="en-US" sz="1200" dirty="0" smtClean="0"/>
+              <a:t>(Dapper)</a:t>
+            </a:r>
+            <a:endParaRPr lang="en-US" sz="1200" dirty="0"/>
+          </a:p>
+        </p:txBody>
+      </p:sp>
+      <p:sp>
+        <p:nvSpPr>
+          <p:cNvPr id="5" name="Flowchart: Magnetic Disk 4"/>
+          <p:cNvSpPr/>
+          <p:nvPr/>
+        </p:nvSpPr>
+        <p:spPr>
+          <a:xfrm>
+            <a:off x="7109411" y="1054206"/>
+            <a:ext cx="1685925" cy="874340"/>
+          </a:xfrm>
+          <a:prstGeom prst="flowChartMagneticDisk">
+            <a:avLst/>
+          </a:prstGeom>
+          <a:ln/>
+        </p:spPr>
+        <p:style>
+          <a:lnRef idx="2">
+            <a:schemeClr val="accent3"/>
+          </a:lnRef>
+          <a:fillRef idx="1">
+            <a:schemeClr val="lt1"/>
+          </a:fillRef>
+          <a:effectRef idx="0">
+            <a:schemeClr val="accent3"/>
+          </a:effectRef>
+          <a:fontRef idx="minor">
+            <a:schemeClr val="dk1"/>
+          </a:fontRef>
+        </p:style>
+        <p:txBody>
+          <a:bodyPr rtlCol="0" anchor="ctr"/>
+          <a:lstStyle/>
+          <a:p>
+            <a:pPr algn="ctr"/>
+            <a:r>
+              <a:rPr lang="en-US" sz="1200" dirty="0" smtClean="0">
+                <a:solidFill>
+                  <a:schemeClr val="tx1"/>
+                </a:solidFill>
+              </a:rPr>
+              <a:t>DATABASE</a:t>
+            </a:r>
+            <a:endParaRPr lang="en-US" sz="1200" dirty="0">
+              <a:solidFill>
+                <a:schemeClr val="tx1"/>
+              </a:solidFill>
+            </a:endParaRPr>
+          </a:p>
+        </p:txBody>
+      </p:sp>
+      <p:cxnSp>
+        <p:nvCxnSpPr>
+          <p:cNvPr id="7" name="Straight Connector 6"/>
+          <p:cNvCxnSpPr/>
+          <p:nvPr/>
+        </p:nvCxnSpPr>
+        <p:spPr>
+          <a:xfrm>
+            <a:off x="1685790" y="2262165"/>
+            <a:ext cx="7172189" cy="0"/>
+          </a:xfrm>
+          <a:prstGeom prst="line">
+            <a:avLst/>
+          </a:prstGeom>
+        </p:spPr>
+        <p:style>
+          <a:lnRef idx="2">
+            <a:schemeClr val="accent3"/>
+          </a:lnRef>
+          <a:fillRef idx="0">
+            <a:schemeClr val="accent3"/>
+          </a:fillRef>
+          <a:effectRef idx="1">
+            <a:schemeClr val="accent3"/>
+          </a:effectRef>
+          <a:fontRef idx="minor">
+            <a:schemeClr val="tx1"/>
+          </a:fontRef>
+        </p:style>
+      </p:cxnSp>
+      <p:sp>
+        <p:nvSpPr>
+          <p:cNvPr id="8" name="Rounded Rectangle 7"/>
+          <p:cNvSpPr/>
+          <p:nvPr/>
+        </p:nvSpPr>
+        <p:spPr>
+          <a:xfrm>
+            <a:off x="1746462" y="2609458"/>
+            <a:ext cx="1828800" cy="796189"/>
+          </a:xfrm>
+          <a:prstGeom prst="roundRect">
+            <a:avLst/>
+          </a:prstGeom>
+        </p:spPr>
+        <p:style>
+          <a:lnRef idx="2">
+            <a:schemeClr val="accent3"/>
+          </a:lnRef>
+          <a:fillRef idx="1">
+            <a:schemeClr val="lt1"/>
+          </a:fillRef>
+          <a:effectRef idx="0">
+            <a:schemeClr val="accent3"/>
+          </a:effectRef>
+          <a:fontRef idx="minor">
+            <a:schemeClr val="dk1"/>
+          </a:fontRef>
+        </p:style>
+        <p:txBody>
+          <a:bodyPr rtlCol="0" anchor="ctr"/>
+          <a:lstStyle/>
+          <a:p>
+            <a:pPr algn="ctr"/>
+            <a:r>
+              <a:rPr lang="en-US" sz="1200" dirty="0" smtClean="0"/>
+              <a:t>RepoDb</a:t>
+            </a:r>
+            <a:endParaRPr lang="en-US" sz="1200" dirty="0"/>
+          </a:p>
+        </p:txBody>
+      </p:sp>
+      <p:sp>
+        <p:nvSpPr>
+          <p:cNvPr id="9" name="Flowchart: Magnetic Disk 8"/>
+          <p:cNvSpPr/>
+          <p:nvPr/>
+        </p:nvSpPr>
+        <p:spPr>
+          <a:xfrm>
+            <a:off x="7109411" y="2570383"/>
+            <a:ext cx="1685925" cy="874340"/>
+          </a:xfrm>
+          <a:prstGeom prst="flowChartMagneticDisk">
+            <a:avLst/>
+          </a:prstGeom>
+          <a:ln/>
+        </p:spPr>
+        <p:style>
+          <a:lnRef idx="2">
+            <a:schemeClr val="accent3"/>
+          </a:lnRef>
+          <a:fillRef idx="1">
+            <a:schemeClr val="lt1"/>
+          </a:fillRef>
+          <a:effectRef idx="0">
+            <a:schemeClr val="accent3"/>
+          </a:effectRef>
+          <a:fontRef idx="minor">
+            <a:schemeClr val="dk1"/>
+          </a:fontRef>
+        </p:style>
+        <p:txBody>
+          <a:bodyPr rtlCol="0" anchor="ctr"/>
+          <a:lstStyle/>
+          <a:p>
+            <a:pPr algn="ctr"/>
+            <a:r>
+              <a:rPr lang="en-US" sz="1200" dirty="0" smtClean="0">
+                <a:solidFill>
+                  <a:schemeClr val="tx1"/>
+                </a:solidFill>
+              </a:rPr>
+              <a:t>DATABASE</a:t>
+            </a:r>
+            <a:endParaRPr lang="en-US" sz="1200" dirty="0">
+              <a:solidFill>
+                <a:schemeClr val="tx1"/>
+              </a:solidFill>
+            </a:endParaRPr>
+          </a:p>
+        </p:txBody>
+      </p:sp>
+      <p:cxnSp>
+        <p:nvCxnSpPr>
+          <p:cNvPr id="10" name="Straight Connector 9"/>
+          <p:cNvCxnSpPr/>
+          <p:nvPr/>
+        </p:nvCxnSpPr>
+        <p:spPr>
+          <a:xfrm>
+            <a:off x="1685790" y="3778342"/>
+            <a:ext cx="7172189" cy="0"/>
+          </a:xfrm>
+          <a:prstGeom prst="line">
+            <a:avLst/>
+          </a:prstGeom>
+        </p:spPr>
+        <p:style>
+          <a:lnRef idx="2">
+            <a:schemeClr val="accent3"/>
+          </a:lnRef>
+          <a:fillRef idx="0">
+            <a:schemeClr val="accent3"/>
+          </a:fillRef>
+          <a:effectRef idx="1">
+            <a:schemeClr val="accent3"/>
+          </a:effectRef>
+          <a:fontRef idx="minor">
+            <a:schemeClr val="tx1"/>
+          </a:fontRef>
+        </p:style>
+      </p:cxnSp>
+      <p:sp>
+        <p:nvSpPr>
+          <p:cNvPr id="11" name="Rounded Rectangle 10"/>
+          <p:cNvSpPr/>
+          <p:nvPr/>
+        </p:nvSpPr>
+        <p:spPr>
+          <a:xfrm>
+            <a:off x="1746462" y="4086558"/>
+            <a:ext cx="1828800" cy="796189"/>
+          </a:xfrm>
+          <a:prstGeom prst="roundRect">
+            <a:avLst/>
+          </a:prstGeom>
+        </p:spPr>
+        <p:style>
+          <a:lnRef idx="2">
+            <a:schemeClr val="accent3"/>
+          </a:lnRef>
+          <a:fillRef idx="1">
+            <a:schemeClr val="lt1"/>
+          </a:fillRef>
+          <a:effectRef idx="0">
+            <a:schemeClr val="accent3"/>
+          </a:effectRef>
+          <a:fontRef idx="minor">
+            <a:schemeClr val="dk1"/>
+          </a:fontRef>
+        </p:style>
+        <p:txBody>
+          <a:bodyPr rtlCol="0" anchor="ctr"/>
+          <a:lstStyle/>
+          <a:p>
+            <a:pPr algn="ctr"/>
+            <a:r>
+              <a:rPr lang="en-US" sz="1200" dirty="0" smtClean="0"/>
+              <a:t>Macro ORM</a:t>
+            </a:r>
+          </a:p>
+          <a:p>
+            <a:pPr algn="ctr"/>
+            <a:r>
+              <a:rPr lang="en-US" sz="1200" dirty="0" smtClean="0"/>
+              <a:t>(EF, NH, LLBLGEN)</a:t>
+            </a:r>
+            <a:endParaRPr lang="en-US" sz="1200" dirty="0"/>
+          </a:p>
+        </p:txBody>
+      </p:sp>
+      <p:sp>
+        <p:nvSpPr>
+          <p:cNvPr id="12" name="Flowchart: Magnetic Disk 11"/>
+          <p:cNvSpPr/>
+          <p:nvPr/>
+        </p:nvSpPr>
+        <p:spPr>
+          <a:xfrm>
+            <a:off x="7109411" y="4047483"/>
+            <a:ext cx="1685925" cy="874340"/>
+          </a:xfrm>
+          <a:prstGeom prst="flowChartMagneticDisk">
+            <a:avLst/>
+          </a:prstGeom>
+          <a:ln/>
+        </p:spPr>
+        <p:style>
+          <a:lnRef idx="2">
+            <a:schemeClr val="accent3"/>
+          </a:lnRef>
+          <a:fillRef idx="1">
+            <a:schemeClr val="lt1"/>
+          </a:fillRef>
+          <a:effectRef idx="0">
+            <a:schemeClr val="accent3"/>
+          </a:effectRef>
+          <a:fontRef idx="minor">
+            <a:schemeClr val="dk1"/>
+          </a:fontRef>
+        </p:style>
+        <p:txBody>
+          <a:bodyPr rtlCol="0" anchor="ctr"/>
+          <a:lstStyle/>
+          <a:p>
+            <a:pPr algn="ctr"/>
+            <a:r>
+              <a:rPr lang="en-US" sz="1200" dirty="0" smtClean="0">
+                <a:solidFill>
+                  <a:schemeClr val="tx1"/>
+                </a:solidFill>
+              </a:rPr>
+              <a:t>DATABASE</a:t>
+            </a:r>
+            <a:endParaRPr lang="en-US" sz="1200" dirty="0">
+              <a:solidFill>
+                <a:schemeClr val="tx1"/>
+              </a:solidFill>
+            </a:endParaRPr>
+          </a:p>
+        </p:txBody>
+      </p:sp>
+      <p:cxnSp>
+        <p:nvCxnSpPr>
+          <p:cNvPr id="13" name="Straight Connector 12"/>
+          <p:cNvCxnSpPr/>
+          <p:nvPr/>
+        </p:nvCxnSpPr>
+        <p:spPr>
+          <a:xfrm>
+            <a:off x="1685790" y="5255442"/>
+            <a:ext cx="7172189" cy="0"/>
+          </a:xfrm>
+          <a:prstGeom prst="line">
+            <a:avLst/>
+          </a:prstGeom>
+        </p:spPr>
+        <p:style>
+          <a:lnRef idx="2">
+            <a:schemeClr val="accent3"/>
+          </a:lnRef>
+          <a:fillRef idx="0">
+            <a:schemeClr val="accent3"/>
+          </a:fillRef>
+          <a:effectRef idx="1">
+            <a:schemeClr val="accent3"/>
+          </a:effectRef>
+          <a:fontRef idx="minor">
+            <a:schemeClr val="tx1"/>
+          </a:fontRef>
+        </p:style>
+      </p:cxnSp>
+      <p:cxnSp>
+        <p:nvCxnSpPr>
+          <p:cNvPr id="14" name="Straight Connector 13"/>
+          <p:cNvCxnSpPr/>
+          <p:nvPr/>
+        </p:nvCxnSpPr>
+        <p:spPr>
+          <a:xfrm>
+            <a:off x="1685790" y="763445"/>
+            <a:ext cx="7172189" cy="0"/>
+          </a:xfrm>
+          <a:prstGeom prst="line">
+            <a:avLst/>
+          </a:prstGeom>
+        </p:spPr>
+        <p:style>
+          <a:lnRef idx="2">
+            <a:schemeClr val="accent3"/>
+          </a:lnRef>
+          <a:fillRef idx="0">
+            <a:schemeClr val="accent3"/>
+          </a:fillRef>
+          <a:effectRef idx="1">
+            <a:schemeClr val="accent3"/>
+          </a:effectRef>
+          <a:fontRef idx="minor">
+            <a:schemeClr val="tx1"/>
+          </a:fontRef>
+        </p:style>
+      </p:cxnSp>
+      <p:sp>
+        <p:nvSpPr>
+          <p:cNvPr id="15" name="Rounded Rectangle 14"/>
+          <p:cNvSpPr/>
+          <p:nvPr/>
+        </p:nvSpPr>
+        <p:spPr>
+          <a:xfrm>
+            <a:off x="4427936" y="1093281"/>
+            <a:ext cx="1828800" cy="796189"/>
+          </a:xfrm>
+          <a:prstGeom prst="roundRect">
+            <a:avLst/>
+          </a:prstGeom>
+        </p:spPr>
+        <p:style>
+          <a:lnRef idx="2">
+            <a:schemeClr val="accent3"/>
+          </a:lnRef>
+          <a:fillRef idx="1">
+            <a:schemeClr val="lt1"/>
+          </a:fillRef>
+          <a:effectRef idx="0">
+            <a:schemeClr val="accent3"/>
+          </a:effectRef>
+          <a:fontRef idx="minor">
+            <a:schemeClr val="dk1"/>
+          </a:fontRef>
+        </p:style>
+        <p:txBody>
+          <a:bodyPr rtlCol="0" anchor="ctr"/>
+          <a:lstStyle/>
+          <a:p>
+            <a:pPr algn="ctr"/>
+            <a:r>
+              <a:rPr lang="en-US" sz="900" dirty="0" smtClean="0"/>
+              <a:t>Raw SQL</a:t>
+            </a:r>
+            <a:endParaRPr lang="en-US" sz="900" dirty="0"/>
+          </a:p>
+        </p:txBody>
+      </p:sp>
+      <p:sp>
+        <p:nvSpPr>
+          <p:cNvPr id="16" name="Rounded Rectangle 15"/>
+          <p:cNvSpPr/>
+          <p:nvPr/>
+        </p:nvSpPr>
+        <p:spPr>
+          <a:xfrm>
+            <a:off x="4427936" y="2609458"/>
+            <a:ext cx="1828800" cy="796189"/>
+          </a:xfrm>
+          <a:prstGeom prst="roundRect">
+            <a:avLst/>
+          </a:prstGeom>
+        </p:spPr>
+        <p:style>
+          <a:lnRef idx="2">
+            <a:schemeClr val="accent3"/>
+          </a:lnRef>
+          <a:fillRef idx="1">
+            <a:schemeClr val="lt1"/>
+          </a:fillRef>
+          <a:effectRef idx="0">
+            <a:schemeClr val="accent3"/>
+          </a:effectRef>
+          <a:fontRef idx="minor">
+            <a:schemeClr val="dk1"/>
+          </a:fontRef>
+        </p:style>
+        <p:txBody>
+          <a:bodyPr rtlCol="0" anchor="ctr"/>
+          <a:lstStyle/>
+          <a:p>
+            <a:pPr algn="ctr"/>
+            <a:r>
+              <a:rPr lang="en-US" sz="900" dirty="0" smtClean="0"/>
+              <a:t>Raw SQL</a:t>
+            </a:r>
+          </a:p>
+          <a:p>
+            <a:pPr algn="ctr"/>
+            <a:r>
+              <a:rPr lang="en-US" sz="900" dirty="0" smtClean="0"/>
+              <a:t>Cache</a:t>
+            </a:r>
+          </a:p>
+          <a:p>
+            <a:pPr algn="ctr"/>
+            <a:r>
+              <a:rPr lang="en-US" sz="900" dirty="0" smtClean="0"/>
+              <a:t>Trace</a:t>
+            </a:r>
+          </a:p>
+          <a:p>
+            <a:pPr algn="ctr"/>
+            <a:r>
+              <a:rPr lang="en-US" sz="900" dirty="0" smtClean="0"/>
+              <a:t>Bulk/Batch Operations</a:t>
+            </a:r>
+          </a:p>
+          <a:p>
+            <a:pPr algn="ctr"/>
+            <a:r>
+              <a:rPr lang="en-US" sz="900" dirty="0" smtClean="0"/>
+              <a:t>Fluent Methods</a:t>
+            </a:r>
+            <a:endParaRPr lang="en-US" sz="900" dirty="0"/>
+          </a:p>
+        </p:txBody>
+      </p:sp>
+      <p:sp>
+        <p:nvSpPr>
+          <p:cNvPr id="17" name="Rounded Rectangle 16"/>
+          <p:cNvSpPr/>
+          <p:nvPr/>
+        </p:nvSpPr>
+        <p:spPr>
+          <a:xfrm>
+            <a:off x="4427936" y="4086557"/>
+            <a:ext cx="1828800" cy="796189"/>
+          </a:xfrm>
+          <a:prstGeom prst="roundRect">
+            <a:avLst/>
+          </a:prstGeom>
+        </p:spPr>
+        <p:style>
+          <a:lnRef idx="2">
+            <a:schemeClr val="accent3"/>
+          </a:lnRef>
+          <a:fillRef idx="1">
+            <a:schemeClr val="lt1"/>
+          </a:fillRef>
+          <a:effectRef idx="0">
+            <a:schemeClr val="accent3"/>
+          </a:effectRef>
+          <a:fontRef idx="minor">
+            <a:schemeClr val="dk1"/>
+          </a:fontRef>
+        </p:style>
+        <p:txBody>
+          <a:bodyPr rtlCol="0" anchor="ctr"/>
+          <a:lstStyle/>
+          <a:p>
+            <a:pPr algn="ctr"/>
+            <a:r>
+              <a:rPr lang="en-US" sz="900" dirty="0" smtClean="0"/>
+              <a:t>RepoDb</a:t>
+            </a:r>
+          </a:p>
+          <a:p>
+            <a:pPr algn="ctr"/>
+            <a:r>
+              <a:rPr lang="en-US" sz="900" dirty="0" smtClean="0"/>
+              <a:t>+</a:t>
+            </a:r>
+          </a:p>
+          <a:p>
+            <a:pPr algn="ctr"/>
+            <a:r>
+              <a:rPr lang="en-US" sz="900" dirty="0" smtClean="0"/>
+              <a:t>State/Change Tracking</a:t>
+            </a:r>
+          </a:p>
+          <a:p>
+            <a:pPr algn="ctr"/>
+            <a:r>
+              <a:rPr lang="en-US" sz="900" dirty="0" smtClean="0"/>
+              <a:t>Schema Versioning</a:t>
+            </a:r>
+          </a:p>
+          <a:p>
+            <a:pPr algn="ctr"/>
+            <a:r>
+              <a:rPr lang="en-US" sz="900" dirty="0" smtClean="0"/>
+              <a:t>Deep Object Graph (</a:t>
+            </a:r>
+            <a:r>
+              <a:rPr lang="en-US" sz="900" dirty="0" err="1" smtClean="0"/>
+              <a:t>etc</a:t>
+            </a:r>
+            <a:r>
+              <a:rPr lang="en-US" sz="900" dirty="0" smtClean="0"/>
+              <a:t>)</a:t>
+            </a:r>
+          </a:p>
+        </p:txBody>
+      </p:sp>
+      <p:cxnSp>
+        <p:nvCxnSpPr>
+          <p:cNvPr id="19" name="Straight Arrow Connector 18"/>
+          <p:cNvCxnSpPr>
+            <a:stCxn id="8" idx="3"/>
+            <a:endCxn id="16" idx="1"/>
+          </p:cNvCxnSpPr>
+          <p:nvPr/>
+        </p:nvCxnSpPr>
+        <p:spPr>
+          <a:xfrm>
+            <a:off x="3575262" y="3007553"/>
+            <a:ext cx="852674" cy="0"/>
+          </a:xfrm>
+          <a:prstGeom prst="straightConnector1">
+            <a:avLst/>
+          </a:prstGeom>
+          <a:ln>
+            <a:tailEnd type="triangle"/>
+          </a:ln>
+        </p:spPr>
+        <p:style>
+          <a:lnRef idx="2">
+            <a:schemeClr val="accent3"/>
+          </a:lnRef>
+          <a:fillRef idx="0">
+            <a:schemeClr val="accent3"/>
+          </a:fillRef>
+          <a:effectRef idx="1">
+            <a:schemeClr val="accent3"/>
+          </a:effectRef>
+          <a:fontRef idx="minor">
+            <a:schemeClr val="tx1"/>
+          </a:fontRef>
+        </p:style>
+      </p:cxnSp>
+      <p:cxnSp>
+        <p:nvCxnSpPr>
+          <p:cNvPr id="20" name="Straight Arrow Connector 19"/>
+          <p:cNvCxnSpPr>
+            <a:stCxn id="16" idx="3"/>
+            <a:endCxn id="9" idx="2"/>
+          </p:cNvCxnSpPr>
+          <p:nvPr/>
+        </p:nvCxnSpPr>
+        <p:spPr>
+          <a:xfrm>
+            <a:off x="6256736" y="3007553"/>
+            <a:ext cx="852675" cy="0"/>
+          </a:xfrm>
+          <a:prstGeom prst="straightConnector1">
+            <a:avLst/>
+          </a:prstGeom>
+          <a:ln>
+            <a:tailEnd type="triangle"/>
+          </a:ln>
+        </p:spPr>
+        <p:style>
+          <a:lnRef idx="2">
+            <a:schemeClr val="accent3"/>
+          </a:lnRef>
+          <a:fillRef idx="0">
+            <a:schemeClr val="accent3"/>
+          </a:fillRef>
+          <a:effectRef idx="1">
+            <a:schemeClr val="accent3"/>
+          </a:effectRef>
+          <a:fontRef idx="minor">
+            <a:schemeClr val="tx1"/>
+          </a:fontRef>
+        </p:style>
+      </p:cxnSp>
+      <p:cxnSp>
+        <p:nvCxnSpPr>
+          <p:cNvPr id="23" name="Straight Arrow Connector 22"/>
+          <p:cNvCxnSpPr>
+            <a:stCxn id="4" idx="3"/>
+            <a:endCxn id="15" idx="1"/>
+          </p:cNvCxnSpPr>
+          <p:nvPr/>
+        </p:nvCxnSpPr>
+        <p:spPr>
+          <a:xfrm>
+            <a:off x="3575262" y="1491376"/>
+            <a:ext cx="852674" cy="0"/>
+          </a:xfrm>
+          <a:prstGeom prst="straightConnector1">
+            <a:avLst/>
+          </a:prstGeom>
+          <a:ln>
+            <a:tailEnd type="triangle"/>
+          </a:ln>
+        </p:spPr>
+        <p:style>
+          <a:lnRef idx="2">
+            <a:schemeClr val="accent3"/>
+          </a:lnRef>
+          <a:fillRef idx="0">
+            <a:schemeClr val="accent3"/>
+          </a:fillRef>
+          <a:effectRef idx="1">
+            <a:schemeClr val="accent3"/>
+          </a:effectRef>
+          <a:fontRef idx="minor">
+            <a:schemeClr val="tx1"/>
+          </a:fontRef>
+        </p:style>
+      </p:cxnSp>
+      <p:cxnSp>
+        <p:nvCxnSpPr>
+          <p:cNvPr id="26" name="Straight Arrow Connector 25"/>
+          <p:cNvCxnSpPr>
+            <a:stCxn id="15" idx="3"/>
+            <a:endCxn id="5" idx="2"/>
+          </p:cNvCxnSpPr>
+          <p:nvPr/>
+        </p:nvCxnSpPr>
+        <p:spPr>
+          <a:xfrm>
+            <a:off x="6256736" y="1491376"/>
+            <a:ext cx="852675" cy="0"/>
+          </a:xfrm>
+          <a:prstGeom prst="straightConnector1">
+            <a:avLst/>
+          </a:prstGeom>
+          <a:ln>
+            <a:tailEnd type="triangle"/>
+          </a:ln>
+        </p:spPr>
+        <p:style>
+          <a:lnRef idx="2">
+            <a:schemeClr val="accent3"/>
+          </a:lnRef>
+          <a:fillRef idx="0">
+            <a:schemeClr val="accent3"/>
+          </a:fillRef>
+          <a:effectRef idx="1">
+            <a:schemeClr val="accent3"/>
+          </a:effectRef>
+          <a:fontRef idx="minor">
+            <a:schemeClr val="tx1"/>
+          </a:fontRef>
+        </p:style>
+      </p:cxnSp>
+      <p:cxnSp>
+        <p:nvCxnSpPr>
+          <p:cNvPr id="29" name="Straight Arrow Connector 28"/>
+          <p:cNvCxnSpPr>
+            <a:stCxn id="11" idx="3"/>
+            <a:endCxn id="17" idx="1"/>
+          </p:cNvCxnSpPr>
+          <p:nvPr/>
+        </p:nvCxnSpPr>
+        <p:spPr>
+          <a:xfrm flipV="1">
+            <a:off x="3575262" y="4484652"/>
+            <a:ext cx="852674" cy="1"/>
+          </a:xfrm>
+          <a:prstGeom prst="straightConnector1">
+            <a:avLst/>
+          </a:prstGeom>
+          <a:ln>
+            <a:tailEnd type="triangle"/>
+          </a:ln>
+        </p:spPr>
+        <p:style>
+          <a:lnRef idx="2">
+            <a:schemeClr val="accent3"/>
+          </a:lnRef>
+          <a:fillRef idx="0">
+            <a:schemeClr val="accent3"/>
+          </a:fillRef>
+          <a:effectRef idx="1">
+            <a:schemeClr val="accent3"/>
+          </a:effectRef>
+          <a:fontRef idx="minor">
+            <a:schemeClr val="tx1"/>
+          </a:fontRef>
+        </p:style>
+      </p:cxnSp>
+      <p:cxnSp>
+        <p:nvCxnSpPr>
+          <p:cNvPr id="32" name="Straight Arrow Connector 31"/>
+          <p:cNvCxnSpPr>
+            <a:stCxn id="17" idx="3"/>
+            <a:endCxn id="12" idx="2"/>
+          </p:cNvCxnSpPr>
+          <p:nvPr/>
+        </p:nvCxnSpPr>
+        <p:spPr>
+          <a:xfrm>
+            <a:off x="6256736" y="4484652"/>
+            <a:ext cx="852675" cy="1"/>
+          </a:xfrm>
+          <a:prstGeom prst="straightConnector1">
+            <a:avLst/>
+          </a:prstGeom>
+          <a:ln>
+            <a:tailEnd type="triangle"/>
+          </a:ln>
+        </p:spPr>
+        <p:style>
+          <a:lnRef idx="2">
+            <a:schemeClr val="accent3"/>
+          </a:lnRef>
+          <a:fillRef idx="0">
+            <a:schemeClr val="accent3"/>
+          </a:fillRef>
+          <a:effectRef idx="1">
+            <a:schemeClr val="accent3"/>
+          </a:effectRef>
+          <a:fontRef idx="minor">
+            <a:schemeClr val="tx1"/>
+          </a:fontRef>
+        </p:style>
+      </p:cxnSp>
+    </p:spTree>
+    <p:extLst>
+      <p:ext uri="{BB962C8B-B14F-4D97-AF65-F5344CB8AC3E}">
+        <p14:creationId xmlns:p14="http://schemas.microsoft.com/office/powerpoint/2010/main" val="1554361922"/>
+      </p:ext>
+    </p:extLst>
+  </p:cSld>
+  <p:clrMapOvr>
+    <a:masterClrMapping/>
+  </p:clrMapOvr>
+</p:sld>
+</file>
+
 <file path=ppt/theme/theme1.xml><?xml version="1.0" encoding="utf-8"?>
 <a:theme xmlns:a="http://schemas.openxmlformats.org/drawingml/2006/main" name="Office Theme">
   <a:themeElements>

</xml_diff>